<commit_message>
Added the overall Architecture
</commit_message>
<xml_diff>
--- a/Presentation/Implementation of sentiment analysis on unstructured data.pptx
+++ b/Presentation/Implementation of sentiment analysis on unstructured data.pptx
@@ -2855,7 +2855,6 @@
               <a:rPr lang="en-IN" sz="1600" dirty="0"/>
               <a:t>The person gets the possible answers based on the supplied documents with page numbers and headings. </a:t>
             </a:r>
-            <a:endParaRPr lang="en-IN" sz="1600" dirty="0"/>
           </a:p>
         </p:txBody>
       </p:sp>
@@ -3035,12 +3034,8 @@
               <a:buNone/>
             </a:pPr>
             <a:r>
-              <a:rPr lang="en-IN" dirty="0" err="1" smtClean="0"/>
-              <a:t>Searchworm</a:t>
-            </a:r>
-            <a:r>
               <a:rPr lang="en-IN" dirty="0" smtClean="0"/>
-              <a:t> uses the following steps to make search easy:</a:t>
+              <a:t>Search worm uses the following steps to make search easy:</a:t>
             </a:r>
           </a:p>
           <a:p>
@@ -3203,31 +3198,45 @@
           <a:p>
             <a:r>
               <a:rPr lang="en-IN" dirty="0" smtClean="0"/>
-              <a:t>Overall Structure of Bookworm</a:t>
+              <a:t>Overall Structure of </a:t>
+            </a:r>
+            <a:r>
+              <a:rPr lang="en-IN" smtClean="0"/>
+              <a:t>Search Worm</a:t>
             </a:r>
             <a:endParaRPr lang="en-IN" dirty="0"/>
           </a:p>
         </p:txBody>
       </p:sp>
-      <p:sp>
-        <p:nvSpPr>
-          <p:cNvPr id="3" name="Content Placeholder 2"/>
-          <p:cNvSpPr>
-            <a:spLocks noGrp="1"/>
-          </p:cNvSpPr>
+      <p:pic>
+        <p:nvPicPr>
+          <p:cNvPr id="4" name="Content Placeholder 3"/>
+          <p:cNvPicPr>
+            <a:picLocks noGrp="1" noChangeAspect="1"/>
+          </p:cNvPicPr>
           <p:nvPr>
             <p:ph idx="1"/>
           </p:nvPr>
-        </p:nvSpPr>
-        <p:spPr/>
-        <p:txBody>
-          <a:bodyPr/>
-          <a:lstStyle/>
-          <a:p>
-            <a:endParaRPr lang="en-IN"/>
-          </a:p>
-        </p:txBody>
-      </p:sp>
+        </p:nvPicPr>
+        <p:blipFill>
+          <a:blip r:embed="rId2">
+            <a:extLst>
+              <a:ext uri="{28A0092B-C50C-407E-A947-70E740481C1C}">
+                <a14:useLocalDpi xmlns:a14="http://schemas.microsoft.com/office/drawing/2010/main" val="0"/>
+              </a:ext>
+            </a:extLst>
+          </a:blip>
+          <a:stretch>
+            <a:fillRect/>
+          </a:stretch>
+        </p:blipFill>
+        <p:spPr>
+          <a:xfrm>
+            <a:off x="4325539" y="811369"/>
+            <a:ext cx="6505592" cy="5060750"/>
+          </a:xfrm>
+        </p:spPr>
+      </p:pic>
     </p:spTree>
     <p:extLst>
       <p:ext uri="{BB962C8B-B14F-4D97-AF65-F5344CB8AC3E}">

</xml_diff>